<commit_message>
Updated solution slide and project management slide
</commit_message>
<xml_diff>
--- a/docs/local_20120506.pptx
+++ b/docs/local_20120506.pptx
@@ -1141,15 +1141,15 @@
     </dgm:pt>
   </dgm:ptLst>
   <dgm:cxnLst>
+    <dgm:cxn modelId="{CAE30B11-CC2A-154F-8816-60E1EA34C7C5}" type="presOf" srcId="{F74E1E6B-6207-4C49-8AA0-22A4F15A5057}" destId="{FC1CBA4E-6E2F-EE48-861D-3EDED8DB6870}" srcOrd="0" destOrd="0" presId="urn:microsoft.com/office/officeart/2005/8/layout/arrow2"/>
+    <dgm:cxn modelId="{14286A4A-3840-3A4A-9C4F-3CAE3CC8677B}" type="presOf" srcId="{78A1E8F4-D03D-CF48-8943-6DE58C206D5A}" destId="{04A6350A-5479-734D-B89B-58D612C6A7CF}" srcOrd="0" destOrd="0" presId="urn:microsoft.com/office/officeart/2005/8/layout/arrow2"/>
+    <dgm:cxn modelId="{FAD75357-6883-9246-B989-F0EAC5059462}" type="presOf" srcId="{BE88FEAD-BFE7-E34C-BCF5-4BA41C0939D4}" destId="{4A2DFF65-509A-544C-9393-D04075A243CD}" srcOrd="0" destOrd="0" presId="urn:microsoft.com/office/officeart/2005/8/layout/arrow2"/>
+    <dgm:cxn modelId="{9B8B400C-3478-EC45-AE8F-FD6185D62D6E}" srcId="{78A1E8F4-D03D-CF48-8943-6DE58C206D5A}" destId="{F74E1E6B-6207-4C49-8AA0-22A4F15A5057}" srcOrd="0" destOrd="0" parTransId="{7FE7242A-A03D-284D-9AAC-989494308C86}" sibTransId="{AB09869F-DD0F-5744-AF56-BD66C760C450}"/>
+    <dgm:cxn modelId="{E512AC72-1457-444A-8463-06B229732841}" srcId="{78A1E8F4-D03D-CF48-8943-6DE58C206D5A}" destId="{40C8586C-B50B-0645-AD8E-8CB09C38AECA}" srcOrd="1" destOrd="0" parTransId="{4324FEA0-05B9-A949-9C16-54BD0AFE50B1}" sibTransId="{016AD713-C304-014B-A008-BAEA553254F5}"/>
     <dgm:cxn modelId="{632C7F91-17B3-EC43-8D9F-BEDA457231F2}" srcId="{78A1E8F4-D03D-CF48-8943-6DE58C206D5A}" destId="{E90090C8-5943-F040-9633-B1B97AE23E5D}" srcOrd="2" destOrd="0" parTransId="{2FA0ADF9-CDA9-554C-8E99-FF053E5DA4CC}" sibTransId="{5E64DACA-D4B3-264A-BBD0-E39BE5657CE2}"/>
-    <dgm:cxn modelId="{9B8B400C-3478-EC45-AE8F-FD6185D62D6E}" srcId="{78A1E8F4-D03D-CF48-8943-6DE58C206D5A}" destId="{F74E1E6B-6207-4C49-8AA0-22A4F15A5057}" srcOrd="0" destOrd="0" parTransId="{7FE7242A-A03D-284D-9AAC-989494308C86}" sibTransId="{AB09869F-DD0F-5744-AF56-BD66C760C450}"/>
+    <dgm:cxn modelId="{833818DA-5101-BA48-B94A-D284ED81F244}" type="presOf" srcId="{E90090C8-5943-F040-9633-B1B97AE23E5D}" destId="{F3C5ACA4-15AE-564E-83B5-CFFBDB844666}" srcOrd="0" destOrd="0" presId="urn:microsoft.com/office/officeart/2005/8/layout/arrow2"/>
+    <dgm:cxn modelId="{3C4E6C1D-1F8C-494E-B997-7BE74D54A3F4}" type="presOf" srcId="{40C8586C-B50B-0645-AD8E-8CB09C38AECA}" destId="{8A30EBEC-BCB4-5F4D-B7DF-22527C033D70}" srcOrd="0" destOrd="0" presId="urn:microsoft.com/office/officeart/2005/8/layout/arrow2"/>
     <dgm:cxn modelId="{B12CC9F1-F25C-324B-9821-8FDFE7DCFC59}" srcId="{78A1E8F4-D03D-CF48-8943-6DE58C206D5A}" destId="{BE88FEAD-BFE7-E34C-BCF5-4BA41C0939D4}" srcOrd="3" destOrd="0" parTransId="{BEDDEB86-AD04-B449-92C3-631EF3DAB54E}" sibTransId="{809877BC-99BF-F541-8046-500E2E05F0AD}"/>
-    <dgm:cxn modelId="{CAE30B11-CC2A-154F-8816-60E1EA34C7C5}" type="presOf" srcId="{F74E1E6B-6207-4C49-8AA0-22A4F15A5057}" destId="{FC1CBA4E-6E2F-EE48-861D-3EDED8DB6870}" srcOrd="0" destOrd="0" presId="urn:microsoft.com/office/officeart/2005/8/layout/arrow2"/>
-    <dgm:cxn modelId="{FAD75357-6883-9246-B989-F0EAC5059462}" type="presOf" srcId="{BE88FEAD-BFE7-E34C-BCF5-4BA41C0939D4}" destId="{4A2DFF65-509A-544C-9393-D04075A243CD}" srcOrd="0" destOrd="0" presId="urn:microsoft.com/office/officeart/2005/8/layout/arrow2"/>
-    <dgm:cxn modelId="{E512AC72-1457-444A-8463-06B229732841}" srcId="{78A1E8F4-D03D-CF48-8943-6DE58C206D5A}" destId="{40C8586C-B50B-0645-AD8E-8CB09C38AECA}" srcOrd="1" destOrd="0" parTransId="{4324FEA0-05B9-A949-9C16-54BD0AFE50B1}" sibTransId="{016AD713-C304-014B-A008-BAEA553254F5}"/>
-    <dgm:cxn modelId="{3C4E6C1D-1F8C-494E-B997-7BE74D54A3F4}" type="presOf" srcId="{40C8586C-B50B-0645-AD8E-8CB09C38AECA}" destId="{8A30EBEC-BCB4-5F4D-B7DF-22527C033D70}" srcOrd="0" destOrd="0" presId="urn:microsoft.com/office/officeart/2005/8/layout/arrow2"/>
-    <dgm:cxn modelId="{833818DA-5101-BA48-B94A-D284ED81F244}" type="presOf" srcId="{E90090C8-5943-F040-9633-B1B97AE23E5D}" destId="{F3C5ACA4-15AE-564E-83B5-CFFBDB844666}" srcOrd="0" destOrd="0" presId="urn:microsoft.com/office/officeart/2005/8/layout/arrow2"/>
-    <dgm:cxn modelId="{14286A4A-3840-3A4A-9C4F-3CAE3CC8677B}" type="presOf" srcId="{78A1E8F4-D03D-CF48-8943-6DE58C206D5A}" destId="{04A6350A-5479-734D-B89B-58D612C6A7CF}" srcOrd="0" destOrd="0" presId="urn:microsoft.com/office/officeart/2005/8/layout/arrow2"/>
     <dgm:cxn modelId="{65866AB4-D3ED-A548-894C-4B4A98D610BC}" type="presParOf" srcId="{04A6350A-5479-734D-B89B-58D612C6A7CF}" destId="{42224D65-0275-CB45-8546-C7B6A8995E25}" srcOrd="0" destOrd="0" presId="urn:microsoft.com/office/officeart/2005/8/layout/arrow2"/>
     <dgm:cxn modelId="{85E1247F-0FDD-2147-AA2A-22C8FCA6C6EC}" type="presParOf" srcId="{04A6350A-5479-734D-B89B-58D612C6A7CF}" destId="{81D78D91-6403-3E4F-9398-B2B69D4255E4}" srcOrd="1" destOrd="0" presId="urn:microsoft.com/office/officeart/2005/8/layout/arrow2"/>
     <dgm:cxn modelId="{4DD1DD6B-7A2F-984E-9F8D-D68054BCDA62}" type="presParOf" srcId="{81D78D91-6403-3E4F-9398-B2B69D4255E4}" destId="{12253921-DF7F-164A-ACD8-7BFE2B59D4EA}" srcOrd="0" destOrd="0" presId="urn:microsoft.com/office/officeart/2005/8/layout/arrow2"/>
@@ -1165,14 +1165,14 @@
   <dgm:whole/>
   <dgm:extLst>
     <a:ext uri="http://schemas.microsoft.com/office/drawing/2008/diagram">
-      <dsp:dataModelExt xmlns:dsp="http://schemas.microsoft.com/office/drawing/2008/diagram" relId="rId6" minVer="http://schemas.openxmlformats.org/drawingml/2006/diagram"/>
+      <dsp:dataModelExt xmlns:dsp="http://schemas.microsoft.com/office/drawing/2008/diagram" xmlns="" relId="rId6" minVer="http://schemas.openxmlformats.org/drawingml/2006/diagram"/>
     </a:ext>
   </dgm:extLst>
 </dgm:dataModel>
 </file>
 
 <file path=ppt/diagrams/drawing1.xml><?xml version="1.0" encoding="utf-8"?>
-<dsp:drawing xmlns:dgm="http://schemas.openxmlformats.org/drawingml/2006/diagram" xmlns:dsp="http://schemas.microsoft.com/office/drawing/2008/diagram" xmlns:a="http://schemas.openxmlformats.org/drawingml/2006/main">
+<dsp:drawing xmlns:dgm="http://schemas.openxmlformats.org/drawingml/2006/diagram" xmlns:a="http://schemas.openxmlformats.org/drawingml/2006/main" xmlns:dsp="http://schemas.microsoft.com/office/drawing/2008/diagram">
   <dsp:spTree>
     <dsp:nvGrpSpPr>
       <dsp:cNvPr id="0" name=""/>
@@ -4596,7 +4596,8 @@
           <a:p>
             <a:fld id="{12D17103-1748-4847-B931-A66DCC960259}" type="datetimeFigureOut">
               <a:rPr lang="en-US" smtClean="0"/>
-              <a:t>5/6/12</a:t>
+              <a:pPr/>
+              <a:t>5/6/2012</a:t>
             </a:fld>
             <a:endParaRPr lang="en-US" dirty="0"/>
           </a:p>
@@ -4638,6 +4639,7 @@
           <a:p>
             <a:fld id="{BE24168B-5171-1E4C-88AD-08B9EAC7E323}" type="slidenum">
               <a:rPr lang="en-US" smtClean="0"/>
+              <a:pPr/>
               <a:t>‹#›</a:t>
             </a:fld>
             <a:endParaRPr lang="en-US" dirty="0"/>
@@ -4647,7 +4649,7 @@
     </p:spTree>
     <p:extLst>
       <p:ext uri="{BB962C8B-B14F-4D97-AF65-F5344CB8AC3E}">
-        <p14:creationId xmlns:p14="http://schemas.microsoft.com/office/powerpoint/2010/main" val="3231040429"/>
+        <p14:creationId xmlns:p14="http://schemas.microsoft.com/office/powerpoint/2010/main" xmlns="" val="3231040429"/>
       </p:ext>
     </p:extLst>
   </p:cSld>
@@ -4766,7 +4768,8 @@
           <a:p>
             <a:fld id="{12D17103-1748-4847-B931-A66DCC960259}" type="datetimeFigureOut">
               <a:rPr lang="en-US" smtClean="0"/>
-              <a:t>5/6/12</a:t>
+              <a:pPr/>
+              <a:t>5/6/2012</a:t>
             </a:fld>
             <a:endParaRPr lang="en-US" dirty="0"/>
           </a:p>
@@ -4808,6 +4811,7 @@
           <a:p>
             <a:fld id="{BE24168B-5171-1E4C-88AD-08B9EAC7E323}" type="slidenum">
               <a:rPr lang="en-US" smtClean="0"/>
+              <a:pPr/>
               <a:t>‹#›</a:t>
             </a:fld>
             <a:endParaRPr lang="en-US" dirty="0"/>
@@ -4817,7 +4821,7 @@
     </p:spTree>
     <p:extLst>
       <p:ext uri="{BB962C8B-B14F-4D97-AF65-F5344CB8AC3E}">
-        <p14:creationId xmlns:p14="http://schemas.microsoft.com/office/powerpoint/2010/main" val="601949194"/>
+        <p14:creationId xmlns:p14="http://schemas.microsoft.com/office/powerpoint/2010/main" xmlns="" val="601949194"/>
       </p:ext>
     </p:extLst>
   </p:cSld>
@@ -4946,7 +4950,8 @@
           <a:p>
             <a:fld id="{12D17103-1748-4847-B931-A66DCC960259}" type="datetimeFigureOut">
               <a:rPr lang="en-US" smtClean="0"/>
-              <a:t>5/6/12</a:t>
+              <a:pPr/>
+              <a:t>5/6/2012</a:t>
             </a:fld>
             <a:endParaRPr lang="en-US" dirty="0"/>
           </a:p>
@@ -4988,6 +4993,7 @@
           <a:p>
             <a:fld id="{BE24168B-5171-1E4C-88AD-08B9EAC7E323}" type="slidenum">
               <a:rPr lang="en-US" smtClean="0"/>
+              <a:pPr/>
               <a:t>‹#›</a:t>
             </a:fld>
             <a:endParaRPr lang="en-US" dirty="0"/>
@@ -4997,7 +5003,7 @@
     </p:spTree>
     <p:extLst>
       <p:ext uri="{BB962C8B-B14F-4D97-AF65-F5344CB8AC3E}">
-        <p14:creationId xmlns:p14="http://schemas.microsoft.com/office/powerpoint/2010/main" val="2366487477"/>
+        <p14:creationId xmlns:p14="http://schemas.microsoft.com/office/powerpoint/2010/main" xmlns="" val="2366487477"/>
       </p:ext>
     </p:extLst>
   </p:cSld>
@@ -5116,7 +5122,8 @@
           <a:p>
             <a:fld id="{12D17103-1748-4847-B931-A66DCC960259}" type="datetimeFigureOut">
               <a:rPr lang="en-US" smtClean="0"/>
-              <a:t>5/6/12</a:t>
+              <a:pPr/>
+              <a:t>5/6/2012</a:t>
             </a:fld>
             <a:endParaRPr lang="en-US" dirty="0"/>
           </a:p>
@@ -5158,6 +5165,7 @@
           <a:p>
             <a:fld id="{BE24168B-5171-1E4C-88AD-08B9EAC7E323}" type="slidenum">
               <a:rPr lang="en-US" smtClean="0"/>
+              <a:pPr/>
               <a:t>‹#›</a:t>
             </a:fld>
             <a:endParaRPr lang="en-US" dirty="0"/>
@@ -5167,7 +5175,7 @@
     </p:spTree>
     <p:extLst>
       <p:ext uri="{BB962C8B-B14F-4D97-AF65-F5344CB8AC3E}">
-        <p14:creationId xmlns:p14="http://schemas.microsoft.com/office/powerpoint/2010/main" val="3805192695"/>
+        <p14:creationId xmlns:p14="http://schemas.microsoft.com/office/powerpoint/2010/main" xmlns="" val="3805192695"/>
       </p:ext>
     </p:extLst>
   </p:cSld>
@@ -5362,7 +5370,8 @@
           <a:p>
             <a:fld id="{12D17103-1748-4847-B931-A66DCC960259}" type="datetimeFigureOut">
               <a:rPr lang="en-US" smtClean="0"/>
-              <a:t>5/6/12</a:t>
+              <a:pPr/>
+              <a:t>5/6/2012</a:t>
             </a:fld>
             <a:endParaRPr lang="en-US" dirty="0"/>
           </a:p>
@@ -5404,6 +5413,7 @@
           <a:p>
             <a:fld id="{BE24168B-5171-1E4C-88AD-08B9EAC7E323}" type="slidenum">
               <a:rPr lang="en-US" smtClean="0"/>
+              <a:pPr/>
               <a:t>‹#›</a:t>
             </a:fld>
             <a:endParaRPr lang="en-US" dirty="0"/>
@@ -5413,7 +5423,7 @@
     </p:spTree>
     <p:extLst>
       <p:ext uri="{BB962C8B-B14F-4D97-AF65-F5344CB8AC3E}">
-        <p14:creationId xmlns:p14="http://schemas.microsoft.com/office/powerpoint/2010/main" val="489557129"/>
+        <p14:creationId xmlns:p14="http://schemas.microsoft.com/office/powerpoint/2010/main" xmlns="" val="489557129"/>
       </p:ext>
     </p:extLst>
   </p:cSld>
@@ -5650,7 +5660,8 @@
           <a:p>
             <a:fld id="{12D17103-1748-4847-B931-A66DCC960259}" type="datetimeFigureOut">
               <a:rPr lang="en-US" smtClean="0"/>
-              <a:t>5/6/12</a:t>
+              <a:pPr/>
+              <a:t>5/6/2012</a:t>
             </a:fld>
             <a:endParaRPr lang="en-US" dirty="0"/>
           </a:p>
@@ -5692,6 +5703,7 @@
           <a:p>
             <a:fld id="{BE24168B-5171-1E4C-88AD-08B9EAC7E323}" type="slidenum">
               <a:rPr lang="en-US" smtClean="0"/>
+              <a:pPr/>
               <a:t>‹#›</a:t>
             </a:fld>
             <a:endParaRPr lang="en-US" dirty="0"/>
@@ -5701,7 +5713,7 @@
     </p:spTree>
     <p:extLst>
       <p:ext uri="{BB962C8B-B14F-4D97-AF65-F5344CB8AC3E}">
-        <p14:creationId xmlns:p14="http://schemas.microsoft.com/office/powerpoint/2010/main" val="237749449"/>
+        <p14:creationId xmlns:p14="http://schemas.microsoft.com/office/powerpoint/2010/main" xmlns="" val="237749449"/>
       </p:ext>
     </p:extLst>
   </p:cSld>
@@ -6072,7 +6084,8 @@
           <a:p>
             <a:fld id="{12D17103-1748-4847-B931-A66DCC960259}" type="datetimeFigureOut">
               <a:rPr lang="en-US" smtClean="0"/>
-              <a:t>5/6/12</a:t>
+              <a:pPr/>
+              <a:t>5/6/2012</a:t>
             </a:fld>
             <a:endParaRPr lang="en-US" dirty="0"/>
           </a:p>
@@ -6114,6 +6127,7 @@
           <a:p>
             <a:fld id="{BE24168B-5171-1E4C-88AD-08B9EAC7E323}" type="slidenum">
               <a:rPr lang="en-US" smtClean="0"/>
+              <a:pPr/>
               <a:t>‹#›</a:t>
             </a:fld>
             <a:endParaRPr lang="en-US" dirty="0"/>
@@ -6123,7 +6137,7 @@
     </p:spTree>
     <p:extLst>
       <p:ext uri="{BB962C8B-B14F-4D97-AF65-F5344CB8AC3E}">
-        <p14:creationId xmlns:p14="http://schemas.microsoft.com/office/powerpoint/2010/main" val="2754041824"/>
+        <p14:creationId xmlns:p14="http://schemas.microsoft.com/office/powerpoint/2010/main" xmlns="" val="2754041824"/>
       </p:ext>
     </p:extLst>
   </p:cSld>
@@ -6190,7 +6204,8 @@
           <a:p>
             <a:fld id="{12D17103-1748-4847-B931-A66DCC960259}" type="datetimeFigureOut">
               <a:rPr lang="en-US" smtClean="0"/>
-              <a:t>5/6/12</a:t>
+              <a:pPr/>
+              <a:t>5/6/2012</a:t>
             </a:fld>
             <a:endParaRPr lang="en-US" dirty="0"/>
           </a:p>
@@ -6232,6 +6247,7 @@
           <a:p>
             <a:fld id="{BE24168B-5171-1E4C-88AD-08B9EAC7E323}" type="slidenum">
               <a:rPr lang="en-US" smtClean="0"/>
+              <a:pPr/>
               <a:t>‹#›</a:t>
             </a:fld>
             <a:endParaRPr lang="en-US" dirty="0"/>
@@ -6241,7 +6257,7 @@
     </p:spTree>
     <p:extLst>
       <p:ext uri="{BB962C8B-B14F-4D97-AF65-F5344CB8AC3E}">
-        <p14:creationId xmlns:p14="http://schemas.microsoft.com/office/powerpoint/2010/main" val="346641713"/>
+        <p14:creationId xmlns:p14="http://schemas.microsoft.com/office/powerpoint/2010/main" xmlns="" val="346641713"/>
       </p:ext>
     </p:extLst>
   </p:cSld>
@@ -6285,7 +6301,8 @@
           <a:p>
             <a:fld id="{12D17103-1748-4847-B931-A66DCC960259}" type="datetimeFigureOut">
               <a:rPr lang="en-US" smtClean="0"/>
-              <a:t>5/6/12</a:t>
+              <a:pPr/>
+              <a:t>5/6/2012</a:t>
             </a:fld>
             <a:endParaRPr lang="en-US" dirty="0"/>
           </a:p>
@@ -6327,6 +6344,7 @@
           <a:p>
             <a:fld id="{BE24168B-5171-1E4C-88AD-08B9EAC7E323}" type="slidenum">
               <a:rPr lang="en-US" smtClean="0"/>
+              <a:pPr/>
               <a:t>‹#›</a:t>
             </a:fld>
             <a:endParaRPr lang="en-US" dirty="0"/>
@@ -6336,7 +6354,7 @@
     </p:spTree>
     <p:extLst>
       <p:ext uri="{BB962C8B-B14F-4D97-AF65-F5344CB8AC3E}">
-        <p14:creationId xmlns:p14="http://schemas.microsoft.com/office/powerpoint/2010/main" val="2972177166"/>
+        <p14:creationId xmlns:p14="http://schemas.microsoft.com/office/powerpoint/2010/main" xmlns="" val="2972177166"/>
       </p:ext>
     </p:extLst>
   </p:cSld>
@@ -6562,7 +6580,8 @@
           <a:p>
             <a:fld id="{12D17103-1748-4847-B931-A66DCC960259}" type="datetimeFigureOut">
               <a:rPr lang="en-US" smtClean="0"/>
-              <a:t>5/6/12</a:t>
+              <a:pPr/>
+              <a:t>5/6/2012</a:t>
             </a:fld>
             <a:endParaRPr lang="en-US" dirty="0"/>
           </a:p>
@@ -6604,6 +6623,7 @@
           <a:p>
             <a:fld id="{BE24168B-5171-1E4C-88AD-08B9EAC7E323}" type="slidenum">
               <a:rPr lang="en-US" smtClean="0"/>
+              <a:pPr/>
               <a:t>‹#›</a:t>
             </a:fld>
             <a:endParaRPr lang="en-US" dirty="0"/>
@@ -6613,7 +6633,7 @@
     </p:spTree>
     <p:extLst>
       <p:ext uri="{BB962C8B-B14F-4D97-AF65-F5344CB8AC3E}">
-        <p14:creationId xmlns:p14="http://schemas.microsoft.com/office/powerpoint/2010/main" val="4232780802"/>
+        <p14:creationId xmlns:p14="http://schemas.microsoft.com/office/powerpoint/2010/main" xmlns="" val="4232780802"/>
       </p:ext>
     </p:extLst>
   </p:cSld>
@@ -6815,7 +6835,8 @@
           <a:p>
             <a:fld id="{12D17103-1748-4847-B931-A66DCC960259}" type="datetimeFigureOut">
               <a:rPr lang="en-US" smtClean="0"/>
-              <a:t>5/6/12</a:t>
+              <a:pPr/>
+              <a:t>5/6/2012</a:t>
             </a:fld>
             <a:endParaRPr lang="en-US" dirty="0"/>
           </a:p>
@@ -6857,6 +6878,7 @@
           <a:p>
             <a:fld id="{BE24168B-5171-1E4C-88AD-08B9EAC7E323}" type="slidenum">
               <a:rPr lang="en-US" smtClean="0"/>
+              <a:pPr/>
               <a:t>‹#›</a:t>
             </a:fld>
             <a:endParaRPr lang="en-US" dirty="0"/>
@@ -6866,7 +6888,7 @@
     </p:spTree>
     <p:extLst>
       <p:ext uri="{BB962C8B-B14F-4D97-AF65-F5344CB8AC3E}">
-        <p14:creationId xmlns:p14="http://schemas.microsoft.com/office/powerpoint/2010/main" val="2675457367"/>
+        <p14:creationId xmlns:p14="http://schemas.microsoft.com/office/powerpoint/2010/main" xmlns="" val="2675457367"/>
       </p:ext>
     </p:extLst>
   </p:cSld>
@@ -7028,7 +7050,8 @@
           <a:p>
             <a:fld id="{12D17103-1748-4847-B931-A66DCC960259}" type="datetimeFigureOut">
               <a:rPr lang="en-US" smtClean="0"/>
-              <a:t>5/6/12</a:t>
+              <a:pPr/>
+              <a:t>5/6/2012</a:t>
             </a:fld>
             <a:endParaRPr lang="en-US" dirty="0"/>
           </a:p>
@@ -7106,6 +7129,7 @@
           <a:p>
             <a:fld id="{BE24168B-5171-1E4C-88AD-08B9EAC7E323}" type="slidenum">
               <a:rPr lang="en-US" smtClean="0"/>
+              <a:pPr/>
               <a:t>‹#›</a:t>
             </a:fld>
             <a:endParaRPr lang="en-US" dirty="0"/>
@@ -7115,7 +7139,7 @@
     </p:spTree>
     <p:extLst>
       <p:ext uri="{BB962C8B-B14F-4D97-AF65-F5344CB8AC3E}">
-        <p14:creationId xmlns:p14="http://schemas.microsoft.com/office/powerpoint/2010/main" val="528073203"/>
+        <p14:creationId xmlns:p14="http://schemas.microsoft.com/office/powerpoint/2010/main" xmlns="" val="528073203"/>
       </p:ext>
     </p:extLst>
   </p:cSld>
@@ -7416,7 +7440,7 @@
             <a:alphaModFix/>
             <a:extLst>
               <a:ext uri="{BEBA8EAE-BF5A-486C-A8C5-ECC9F3942E4B}">
-                <a14:imgProps xmlns:a14="http://schemas.microsoft.com/office/drawing/2010/main">
+                <a14:imgProps xmlns:a14="http://schemas.microsoft.com/office/drawing/2010/main" xmlns="">
                   <a14:imgLayer r:embed="rId3">
                     <a14:imgEffect>
                       <a14:sharpenSoften amount="-30000"/>
@@ -7428,7 +7452,7 @@
                 </a14:imgProps>
               </a:ext>
               <a:ext uri="{28A0092B-C50C-407E-A947-70E740481C1C}">
-                <a14:useLocalDpi xmlns:a14="http://schemas.microsoft.com/office/drawing/2010/main" val="0"/>
+                <a14:useLocalDpi xmlns:a14="http://schemas.microsoft.com/office/drawing/2010/main" xmlns="" val="0"/>
               </a:ext>
             </a:extLst>
           </a:blip>
@@ -7676,7 +7700,7 @@
     </p:spTree>
     <p:extLst>
       <p:ext uri="{BB962C8B-B14F-4D97-AF65-F5344CB8AC3E}">
-        <p14:creationId xmlns:p14="http://schemas.microsoft.com/office/powerpoint/2010/main" val="3449312616"/>
+        <p14:creationId xmlns:p14="http://schemas.microsoft.com/office/powerpoint/2010/main" xmlns="" val="3449312616"/>
       </p:ext>
     </p:extLst>
   </p:cSld>
@@ -7686,7 +7710,7 @@
   <p:timing>
     <p:tnLst>
       <p:par>
-        <p:cTn xmlns:p14="http://schemas.microsoft.com/office/powerpoint/2010/main" id="1" dur="indefinite" restart="never" nodeType="tmRoot"/>
+        <p:cTn id="1" dur="indefinite" restart="never" nodeType="tmRoot"/>
       </p:par>
     </p:tnLst>
   </p:timing>
@@ -9030,7 +9054,7 @@
     </p:spTree>
     <p:extLst>
       <p:ext uri="{BB962C8B-B14F-4D97-AF65-F5344CB8AC3E}">
-        <p14:creationId xmlns:p14="http://schemas.microsoft.com/office/powerpoint/2010/main" val="377019852"/>
+        <p14:creationId xmlns:p14="http://schemas.microsoft.com/office/powerpoint/2010/main" xmlns="" val="377019852"/>
       </p:ext>
     </p:extLst>
   </p:cSld>
@@ -9185,7 +9209,23 @@
                   <a:srgbClr val="800000"/>
                 </a:solidFill>
               </a:rPr>
-              <a:t>Solve the Traveling Salesman problem</a:t>
+              <a:t>Solve the Traveling </a:t>
+            </a:r>
+            <a:r>
+              <a:rPr lang="en-US" sz="2400" u="sng" dirty="0" smtClean="0">
+                <a:solidFill>
+                  <a:srgbClr val="800000"/>
+                </a:solidFill>
+              </a:rPr>
+              <a:t>Salesman </a:t>
+            </a:r>
+            <a:r>
+              <a:rPr lang="en-US" sz="2400" u="sng" dirty="0" smtClean="0">
+                <a:solidFill>
+                  <a:srgbClr val="800000"/>
+                </a:solidFill>
+              </a:rPr>
+              <a:t>problem</a:t>
             </a:r>
             <a:r>
               <a:rPr lang="en-US" sz="2400" dirty="0" smtClean="0"/>
@@ -9201,7 +9241,7 @@
           <p:nvPr>
             <p:extLst>
               <p:ext uri="{D42A27DB-BD31-4B8C-83A1-F6EECF244321}">
-                <p14:modId xmlns:p14="http://schemas.microsoft.com/office/powerpoint/2010/main" val="1247115790"/>
+                <p14:modId xmlns:p14="http://schemas.microsoft.com/office/powerpoint/2010/main" xmlns="" val="1247115790"/>
               </p:ext>
             </p:extLst>
           </p:nvPr>
@@ -9391,7 +9431,7 @@
     </p:spTree>
     <p:extLst>
       <p:ext uri="{BB962C8B-B14F-4D97-AF65-F5344CB8AC3E}">
-        <p14:creationId xmlns:p14="http://schemas.microsoft.com/office/powerpoint/2010/main" val="625530006"/>
+        <p14:creationId xmlns:p14="http://schemas.microsoft.com/office/powerpoint/2010/main" xmlns="" val="625530006"/>
       </p:ext>
     </p:extLst>
   </p:cSld>
@@ -9502,7 +9542,7 @@
           <a:blip r:embed="rId2" cstate="print">
             <a:extLst>
               <a:ext uri="{28A0092B-C50C-407E-A947-70E740481C1C}">
-                <a14:useLocalDpi xmlns:a14="http://schemas.microsoft.com/office/drawing/2010/main"/>
+                <a14:useLocalDpi xmlns:a14="http://schemas.microsoft.com/office/drawing/2010/main" xmlns=""/>
               </a:ext>
             </a:extLst>
           </a:blip>
@@ -9536,7 +9576,7 @@
           <a:blip r:embed="rId3" cstate="print">
             <a:extLst>
               <a:ext uri="{28A0092B-C50C-407E-A947-70E740481C1C}">
-                <a14:useLocalDpi xmlns:a14="http://schemas.microsoft.com/office/drawing/2010/main"/>
+                <a14:useLocalDpi xmlns:a14="http://schemas.microsoft.com/office/drawing/2010/main" xmlns=""/>
               </a:ext>
             </a:extLst>
           </a:blip>
@@ -9570,7 +9610,7 @@
           <a:blip r:embed="rId4" cstate="print">
             <a:extLst>
               <a:ext uri="{28A0092B-C50C-407E-A947-70E740481C1C}">
-                <a14:useLocalDpi xmlns:a14="http://schemas.microsoft.com/office/drawing/2010/main"/>
+                <a14:useLocalDpi xmlns:a14="http://schemas.microsoft.com/office/drawing/2010/main" xmlns=""/>
               </a:ext>
             </a:extLst>
           </a:blip>
@@ -9606,7 +9646,7 @@
           <a:blip r:embed="rId5" cstate="print">
             <a:extLst>
               <a:ext uri="{28A0092B-C50C-407E-A947-70E740481C1C}">
-                <a14:useLocalDpi xmlns:a14="http://schemas.microsoft.com/office/drawing/2010/main"/>
+                <a14:useLocalDpi xmlns:a14="http://schemas.microsoft.com/office/drawing/2010/main" xmlns=""/>
               </a:ext>
             </a:extLst>
           </a:blip>
@@ -10151,7 +10191,7 @@
     </p:spTree>
     <p:extLst>
       <p:ext uri="{BB962C8B-B14F-4D97-AF65-F5344CB8AC3E}">
-        <p14:creationId xmlns:p14="http://schemas.microsoft.com/office/powerpoint/2010/main" val="2021590078"/>
+        <p14:creationId xmlns:p14="http://schemas.microsoft.com/office/powerpoint/2010/main" xmlns="" val="2021590078"/>
       </p:ext>
     </p:extLst>
   </p:cSld>
@@ -10161,7 +10201,7 @@
   <p:timing>
     <p:tnLst>
       <p:par>
-        <p:cTn xmlns:p14="http://schemas.microsoft.com/office/powerpoint/2010/main" id="1" dur="indefinite" restart="never" nodeType="tmRoot">
+        <p:cTn id="1" dur="indefinite" restart="never" nodeType="tmRoot">
           <p:childTnLst>
             <p:seq concurrent="1" nextAc="seek">
               <p:cTn id="2" dur="indefinite" nodeType="mainSeq">
@@ -11014,7 +11054,7 @@
     </p:spTree>
     <p:extLst>
       <p:ext uri="{BB962C8B-B14F-4D97-AF65-F5344CB8AC3E}">
-        <p14:creationId xmlns:p14="http://schemas.microsoft.com/office/powerpoint/2010/main" val="3744042663"/>
+        <p14:creationId xmlns:p14="http://schemas.microsoft.com/office/powerpoint/2010/main" xmlns="" val="3744042663"/>
       </p:ext>
     </p:extLst>
   </p:cSld>
@@ -11074,7 +11114,12 @@
             <p:ph sz="half" idx="1"/>
           </p:nvPr>
         </p:nvSpPr>
-        <p:spPr/>
+        <p:spPr>
+          <a:xfrm>
+            <a:off x="457200" y="2769704"/>
+            <a:ext cx="4038600" cy="3197087"/>
+          </a:xfrm>
+        </p:spPr>
         <p:txBody>
           <a:bodyPr/>
           <a:lstStyle/>
@@ -11087,13 +11132,40 @@
           <a:p>
             <a:r>
               <a:rPr lang="en-US" dirty="0" smtClean="0"/>
-              <a:t>Updating each other often</a:t>
-            </a:r>
-          </a:p>
-          <a:p>
+              <a:t>Updated </a:t>
+            </a:r>
             <a:r>
               <a:rPr lang="en-US" dirty="0" smtClean="0"/>
-              <a:t>Delightfully ahead of schedule</a:t>
+              <a:t>each other </a:t>
+            </a:r>
+            <a:r>
+              <a:rPr lang="en-US" dirty="0" smtClean="0"/>
+              <a:t>often</a:t>
+            </a:r>
+          </a:p>
+          <a:p>
+            <a:r>
+              <a:rPr lang="en-US" dirty="0" smtClean="0"/>
+              <a:t>Mature about conflicts</a:t>
+            </a:r>
+            <a:endParaRPr lang="en-US" dirty="0" smtClean="0"/>
+          </a:p>
+          <a:p>
+            <a:r>
+              <a:rPr lang="en-US" dirty="0" smtClean="0"/>
+              <a:t>Delightfully </a:t>
+            </a:r>
+            <a:r>
+              <a:rPr lang="en-US" dirty="0" smtClean="0"/>
+              <a:t>on</a:t>
+            </a:r>
+            <a:r>
+              <a:rPr lang="en-US" dirty="0" smtClean="0"/>
+              <a:t> </a:t>
+            </a:r>
+            <a:r>
+              <a:rPr lang="en-US" dirty="0" smtClean="0"/>
+              <a:t>schedule</a:t>
             </a:r>
             <a:endParaRPr lang="en-US" dirty="0"/>
           </a:p>
@@ -11109,7 +11181,12 @@
             <p:ph sz="half" idx="2"/>
           </p:nvPr>
         </p:nvSpPr>
-        <p:spPr/>
+        <p:spPr>
+          <a:xfrm>
+            <a:off x="4648200" y="2756452"/>
+            <a:ext cx="4038600" cy="3342861"/>
+          </a:xfrm>
+        </p:spPr>
         <p:txBody>
           <a:bodyPr/>
           <a:lstStyle/>
@@ -11128,16 +11205,212 @@
           <a:p>
             <a:r>
               <a:rPr lang="en-US" dirty="0" smtClean="0"/>
-              <a:t>Didn’t get local programs up and running till the last week</a:t>
+              <a:t>Didn’t get </a:t>
+            </a:r>
+            <a:r>
+              <a:rPr lang="en-US" dirty="0" smtClean="0"/>
+              <a:t>complex </a:t>
+            </a:r>
+            <a:r>
+              <a:rPr lang="en-US" dirty="0" smtClean="0"/>
+              <a:t>local </a:t>
+            </a:r>
+            <a:r>
+              <a:rPr lang="en-US" dirty="0" smtClean="0"/>
+              <a:t>programs up and running till the last week</a:t>
             </a:r>
             <a:endParaRPr lang="en-US" dirty="0"/>
           </a:p>
         </p:txBody>
       </p:sp>
+      <p:grpSp>
+        <p:nvGrpSpPr>
+          <p:cNvPr id="7" name="Group 6"/>
+          <p:cNvGrpSpPr/>
+          <p:nvPr/>
+        </p:nvGrpSpPr>
+        <p:grpSpPr>
+          <a:xfrm>
+            <a:off x="1775790" y="1589914"/>
+            <a:ext cx="1298713" cy="947875"/>
+            <a:chOff x="8140700" y="1955800"/>
+            <a:chExt cx="457200" cy="406400"/>
+          </a:xfrm>
+          <a:effectLst>
+            <a:glow rad="25400">
+              <a:srgbClr val="008000">
+                <a:alpha val="75000"/>
+              </a:srgbClr>
+            </a:glow>
+          </a:effectLst>
+        </p:grpSpPr>
+        <p:cxnSp>
+          <p:nvCxnSpPr>
+            <p:cNvPr id="8" name="Straight Connector 7"/>
+            <p:cNvCxnSpPr/>
+            <p:nvPr/>
+          </p:nvCxnSpPr>
+          <p:spPr>
+            <a:xfrm>
+              <a:off x="8140700" y="2209800"/>
+              <a:ext cx="203200" cy="152400"/>
+            </a:xfrm>
+            <a:prstGeom prst="line">
+              <a:avLst/>
+            </a:prstGeom>
+            <a:ln>
+              <a:solidFill>
+                <a:srgbClr val="008000"/>
+              </a:solidFill>
+            </a:ln>
+          </p:spPr>
+          <p:style>
+            <a:lnRef idx="2">
+              <a:schemeClr val="accent1"/>
+            </a:lnRef>
+            <a:fillRef idx="0">
+              <a:schemeClr val="accent1"/>
+            </a:fillRef>
+            <a:effectRef idx="1">
+              <a:schemeClr val="accent1"/>
+            </a:effectRef>
+            <a:fontRef idx="minor">
+              <a:schemeClr val="tx1"/>
+            </a:fontRef>
+          </p:style>
+        </p:cxnSp>
+        <p:cxnSp>
+          <p:nvCxnSpPr>
+            <p:cNvPr id="9" name="Straight Connector 8"/>
+            <p:cNvCxnSpPr/>
+            <p:nvPr/>
+          </p:nvCxnSpPr>
+          <p:spPr>
+            <a:xfrm flipV="1">
+              <a:off x="8343900" y="1955800"/>
+              <a:ext cx="254000" cy="406400"/>
+            </a:xfrm>
+            <a:prstGeom prst="line">
+              <a:avLst/>
+            </a:prstGeom>
+            <a:ln>
+              <a:solidFill>
+                <a:srgbClr val="008000"/>
+              </a:solidFill>
+            </a:ln>
+          </p:spPr>
+          <p:style>
+            <a:lnRef idx="2">
+              <a:schemeClr val="accent1"/>
+            </a:lnRef>
+            <a:fillRef idx="0">
+              <a:schemeClr val="accent1"/>
+            </a:fillRef>
+            <a:effectRef idx="1">
+              <a:schemeClr val="accent1"/>
+            </a:effectRef>
+            <a:fontRef idx="minor">
+              <a:schemeClr val="tx1"/>
+            </a:fontRef>
+          </p:style>
+        </p:cxnSp>
+      </p:grpSp>
+      <p:grpSp>
+        <p:nvGrpSpPr>
+          <p:cNvPr id="10" name="Group 9"/>
+          <p:cNvGrpSpPr/>
+          <p:nvPr/>
+        </p:nvGrpSpPr>
+        <p:grpSpPr>
+          <a:xfrm>
+            <a:off x="6232938" y="1497150"/>
+            <a:ext cx="1055757" cy="764698"/>
+            <a:chOff x="8077200" y="3021778"/>
+            <a:chExt cx="406400" cy="292922"/>
+          </a:xfrm>
+          <a:effectLst>
+            <a:glow rad="38100">
+              <a:srgbClr val="FF0000">
+                <a:alpha val="75000"/>
+              </a:srgbClr>
+            </a:glow>
+          </a:effectLst>
+        </p:grpSpPr>
+        <p:cxnSp>
+          <p:nvCxnSpPr>
+            <p:cNvPr id="11" name="Straight Connector 10"/>
+            <p:cNvCxnSpPr/>
+            <p:nvPr/>
+          </p:nvCxnSpPr>
+          <p:spPr>
+            <a:xfrm>
+              <a:off x="8077200" y="3021778"/>
+              <a:ext cx="406400" cy="292922"/>
+            </a:xfrm>
+            <a:prstGeom prst="line">
+              <a:avLst/>
+            </a:prstGeom>
+            <a:ln>
+              <a:solidFill>
+                <a:srgbClr val="FF0000"/>
+              </a:solidFill>
+            </a:ln>
+          </p:spPr>
+          <p:style>
+            <a:lnRef idx="2">
+              <a:schemeClr val="accent1"/>
+            </a:lnRef>
+            <a:fillRef idx="0">
+              <a:schemeClr val="accent1"/>
+            </a:fillRef>
+            <a:effectRef idx="1">
+              <a:schemeClr val="accent1"/>
+            </a:effectRef>
+            <a:fontRef idx="minor">
+              <a:schemeClr val="tx1"/>
+            </a:fontRef>
+          </p:style>
+        </p:cxnSp>
+        <p:cxnSp>
+          <p:nvCxnSpPr>
+            <p:cNvPr id="12" name="Straight Connector 11"/>
+            <p:cNvCxnSpPr/>
+            <p:nvPr/>
+          </p:nvCxnSpPr>
+          <p:spPr>
+            <a:xfrm flipV="1">
+              <a:off x="8077200" y="3021778"/>
+              <a:ext cx="406400" cy="292922"/>
+            </a:xfrm>
+            <a:prstGeom prst="line">
+              <a:avLst/>
+            </a:prstGeom>
+            <a:ln>
+              <a:solidFill>
+                <a:srgbClr val="FF0000"/>
+              </a:solidFill>
+            </a:ln>
+          </p:spPr>
+          <p:style>
+            <a:lnRef idx="2">
+              <a:schemeClr val="accent1"/>
+            </a:lnRef>
+            <a:fillRef idx="0">
+              <a:schemeClr val="accent1"/>
+            </a:fillRef>
+            <a:effectRef idx="1">
+              <a:schemeClr val="accent1"/>
+            </a:effectRef>
+            <a:fontRef idx="minor">
+              <a:schemeClr val="tx1"/>
+            </a:fontRef>
+          </p:style>
+        </p:cxnSp>
+      </p:grpSp>
     </p:spTree>
     <p:extLst>
       <p:ext uri="{BB962C8B-B14F-4D97-AF65-F5344CB8AC3E}">
-        <p14:creationId xmlns:p14="http://schemas.microsoft.com/office/powerpoint/2010/main" val="3212413876"/>
+        <p14:creationId xmlns:p14="http://schemas.microsoft.com/office/powerpoint/2010/main" xmlns="" val="3212413876"/>
       </p:ext>
     </p:extLst>
   </p:cSld>
@@ -11360,7 +11633,7 @@
     </p:spTree>
     <p:extLst>
       <p:ext uri="{BB962C8B-B14F-4D97-AF65-F5344CB8AC3E}">
-        <p14:creationId xmlns:p14="http://schemas.microsoft.com/office/powerpoint/2010/main" val="1858865183"/>
+        <p14:creationId xmlns:p14="http://schemas.microsoft.com/office/powerpoint/2010/main" xmlns="" val="1858865183"/>
       </p:ext>
     </p:extLst>
   </p:cSld>
@@ -11432,7 +11705,7 @@
     </p:spTree>
     <p:extLst>
       <p:ext uri="{BB962C8B-B14F-4D97-AF65-F5344CB8AC3E}">
-        <p14:creationId xmlns:p14="http://schemas.microsoft.com/office/powerpoint/2010/main" val="798869054"/>
+        <p14:creationId xmlns:p14="http://schemas.microsoft.com/office/powerpoint/2010/main" xmlns="" val="798869054"/>
       </p:ext>
     </p:extLst>
   </p:cSld>
@@ -11629,7 +11902,7 @@
     </p:spTree>
     <p:extLst>
       <p:ext uri="{BB962C8B-B14F-4D97-AF65-F5344CB8AC3E}">
-        <p14:creationId xmlns:p14="http://schemas.microsoft.com/office/powerpoint/2010/main" val="215984204"/>
+        <p14:creationId xmlns:p14="http://schemas.microsoft.com/office/powerpoint/2010/main" xmlns="" val="215984204"/>
       </p:ext>
     </p:extLst>
   </p:cSld>
@@ -11639,7 +11912,7 @@
   <p:timing>
     <p:tnLst>
       <p:par>
-        <p:cTn xmlns:p14="http://schemas.microsoft.com/office/powerpoint/2010/main" id="1" dur="indefinite" restart="never" nodeType="tmRoot">
+        <p:cTn id="1" dur="indefinite" restart="never" nodeType="tmRoot">
           <p:childTnLst>
             <p:seq concurrent="1" nextAc="seek">
               <p:cTn id="2" dur="indefinite" nodeType="mainSeq">
@@ -12356,7 +12629,7 @@
     </p:spTree>
     <p:extLst>
       <p:ext uri="{BB962C8B-B14F-4D97-AF65-F5344CB8AC3E}">
-        <p14:creationId xmlns:p14="http://schemas.microsoft.com/office/powerpoint/2010/main" val="2452047840"/>
+        <p14:creationId xmlns:p14="http://schemas.microsoft.com/office/powerpoint/2010/main" xmlns="" val="2452047840"/>
       </p:ext>
     </p:extLst>
   </p:cSld>
@@ -12366,7 +12639,7 @@
   <p:timing>
     <p:tnLst>
       <p:par>
-        <p:cTn xmlns:p14="http://schemas.microsoft.com/office/powerpoint/2010/main" id="1" dur="indefinite" restart="never" nodeType="tmRoot"/>
+        <p:cTn id="1" dur="indefinite" restart="never" nodeType="tmRoot"/>
       </p:par>
     </p:tnLst>
   </p:timing>
@@ -12438,13 +12711,124 @@
         </p:spPr>
         <p:txBody>
           <a:bodyPr>
-            <a:normAutofit/>
+            <a:normAutofit fontScale="92500" lnSpcReduction="20000"/>
           </a:bodyPr>
           <a:lstStyle/>
           <a:p>
-            <a:pPr marL="0" indent="0">
-              <a:buNone/>
-            </a:pPr>
+            <a:pPr marL="0" indent="0"/>
+            <a:r>
+              <a:rPr lang="en-US" dirty="0" smtClean="0"/>
+              <a:t> Existing techniques</a:t>
+            </a:r>
+          </a:p>
+          <a:p>
+            <a:pPr marL="400050" lvl="1" indent="0"/>
+            <a:r>
+              <a:rPr lang="en-US" dirty="0" smtClean="0"/>
+              <a:t> </a:t>
+            </a:r>
+            <a:r>
+              <a:rPr lang="en-US" dirty="0" err="1" smtClean="0"/>
+              <a:t>MongoDB</a:t>
+            </a:r>
+            <a:endParaRPr lang="en-US" dirty="0" smtClean="0"/>
+          </a:p>
+          <a:p>
+            <a:pPr marL="400050" lvl="1" indent="0"/>
+            <a:r>
+              <a:rPr lang="en-US" dirty="0" smtClean="0"/>
+              <a:t> </a:t>
+            </a:r>
+            <a:r>
+              <a:rPr lang="en-US" dirty="0" err="1" smtClean="0"/>
+              <a:t>PostGIS</a:t>
+            </a:r>
+            <a:r>
+              <a:rPr lang="en-US" dirty="0" smtClean="0"/>
+              <a:t> in </a:t>
+            </a:r>
+            <a:r>
+              <a:rPr lang="en-US" dirty="0" err="1" smtClean="0"/>
+              <a:t>PostgreSQL</a:t>
+            </a:r>
+            <a:endParaRPr lang="en-US" dirty="0" smtClean="0"/>
+          </a:p>
+          <a:p>
+            <a:pPr marL="400050" lvl="1" indent="0"/>
+            <a:r>
+              <a:rPr lang="en-US" dirty="0" smtClean="0"/>
+              <a:t>Libraries in Java</a:t>
+            </a:r>
+          </a:p>
+          <a:p>
+            <a:pPr marL="0" indent="0"/>
+            <a:r>
+              <a:rPr lang="en-US" dirty="0" smtClean="0"/>
+              <a:t> </a:t>
+            </a:r>
+            <a:r>
+              <a:rPr lang="en-US" dirty="0" smtClean="0"/>
+              <a:t>Convenient?</a:t>
+            </a:r>
+          </a:p>
+          <a:p>
+            <a:pPr marL="400050" lvl="1" indent="0"/>
+            <a:r>
+              <a:rPr lang="en-US" dirty="0" smtClean="0"/>
+              <a:t>No! Complex and </a:t>
+            </a:r>
+            <a:r>
+              <a:rPr lang="en-US" dirty="0" err="1" smtClean="0"/>
+              <a:t>unweildy</a:t>
+            </a:r>
+            <a:endParaRPr lang="en-US" dirty="0" smtClean="0"/>
+          </a:p>
+          <a:p>
+            <a:pPr marL="400050" lvl="1" indent="0"/>
+            <a:r>
+              <a:rPr lang="en-US" dirty="0" smtClean="0"/>
+              <a:t>No native support</a:t>
+            </a:r>
+          </a:p>
+          <a:p>
+            <a:pPr marL="0" indent="0"/>
+            <a:r>
+              <a:rPr lang="en-US" dirty="0" smtClean="0"/>
+              <a:t> </a:t>
+            </a:r>
+            <a:r>
+              <a:rPr lang="en-US" dirty="0" smtClean="0"/>
+              <a:t>local aims to bridge this gap</a:t>
+            </a:r>
+          </a:p>
+          <a:p>
+            <a:pPr marL="400050" lvl="1" indent="0"/>
+            <a:r>
+              <a:rPr lang="en-US" dirty="0" smtClean="0"/>
+              <a:t>Native co-ordinate data-types</a:t>
+            </a:r>
+          </a:p>
+          <a:p>
+            <a:pPr marL="400050" lvl="1" indent="0"/>
+            <a:r>
+              <a:rPr lang="en-US" dirty="0" smtClean="0"/>
+              <a:t>“Python-</a:t>
+            </a:r>
+            <a:r>
+              <a:rPr lang="en-US" dirty="0" err="1" smtClean="0"/>
+              <a:t>esque</a:t>
+            </a:r>
+            <a:r>
+              <a:rPr lang="en-US" dirty="0" smtClean="0"/>
+              <a:t>”</a:t>
+            </a:r>
+          </a:p>
+          <a:p>
+            <a:pPr marL="400050" lvl="1" indent="0"/>
+            <a:r>
+              <a:rPr lang="en-US" dirty="0" smtClean="0"/>
+              <a:t>Strong string manipulation</a:t>
+            </a:r>
             <a:endParaRPr lang="en-US" dirty="0"/>
           </a:p>
         </p:txBody>
@@ -12452,7 +12836,7 @@
     </p:spTree>
     <p:extLst>
       <p:ext uri="{BB962C8B-B14F-4D97-AF65-F5344CB8AC3E}">
-        <p14:creationId xmlns:p14="http://schemas.microsoft.com/office/powerpoint/2010/main" val="4102193222"/>
+        <p14:creationId xmlns:p14="http://schemas.microsoft.com/office/powerpoint/2010/main" xmlns="" val="4102193222"/>
       </p:ext>
     </p:extLst>
   </p:cSld>
@@ -12462,7 +12846,7 @@
   <p:timing>
     <p:tnLst>
       <p:par>
-        <p:cTn xmlns:p14="http://schemas.microsoft.com/office/powerpoint/2010/main" id="1" dur="indefinite" restart="never" nodeType="tmRoot"/>
+        <p:cTn id="1" dur="indefinite" restart="never" nodeType="tmRoot"/>
       </p:par>
     </p:tnLst>
   </p:timing>
@@ -13191,7 +13575,7 @@
     </p:spTree>
     <p:extLst>
       <p:ext uri="{BB962C8B-B14F-4D97-AF65-F5344CB8AC3E}">
-        <p14:creationId xmlns:p14="http://schemas.microsoft.com/office/powerpoint/2010/main" val="44400061"/>
+        <p14:creationId xmlns:p14="http://schemas.microsoft.com/office/powerpoint/2010/main" xmlns="" val="44400061"/>
       </p:ext>
     </p:extLst>
   </p:cSld>
@@ -13201,7 +13585,7 @@
   <p:timing>
     <p:tnLst>
       <p:par>
-        <p:cTn xmlns:p14="http://schemas.microsoft.com/office/powerpoint/2010/main" id="1" dur="indefinite" restart="never" nodeType="tmRoot"/>
+        <p:cTn id="1" dur="indefinite" restart="never" nodeType="tmRoot"/>
       </p:par>
     </p:tnLst>
   </p:timing>
@@ -15115,7 +15499,7 @@
     </p:spTree>
     <p:extLst>
       <p:ext uri="{BB962C8B-B14F-4D97-AF65-F5344CB8AC3E}">
-        <p14:creationId xmlns:p14="http://schemas.microsoft.com/office/powerpoint/2010/main" val="1195539260"/>
+        <p14:creationId xmlns:p14="http://schemas.microsoft.com/office/powerpoint/2010/main" xmlns="" val="1195539260"/>
       </p:ext>
     </p:extLst>
   </p:cSld>
@@ -15159,7 +15543,11 @@
           <a:p>
             <a:r>
               <a:rPr lang="en-US" dirty="0" smtClean="0"/>
-              <a:t>Project Management</a:t>
+              <a:t>Project </a:t>
+            </a:r>
+            <a:r>
+              <a:rPr lang="en-US" dirty="0" smtClean="0"/>
+              <a:t>Development</a:t>
             </a:r>
             <a:endParaRPr lang="en-US" dirty="0"/>
           </a:p>
@@ -15180,6 +15568,56 @@
           <a:bodyPr/>
           <a:lstStyle/>
           <a:p>
+            <a:r>
+              <a:rPr lang="en-US" dirty="0" smtClean="0"/>
+              <a:t>Quasi – Agile development</a:t>
+            </a:r>
+          </a:p>
+          <a:p>
+            <a:pPr lvl="1"/>
+            <a:r>
+              <a:rPr lang="en-US" dirty="0" smtClean="0"/>
+              <a:t>Weekly deliverables</a:t>
+            </a:r>
+          </a:p>
+          <a:p>
+            <a:pPr lvl="1"/>
+            <a:r>
+              <a:rPr lang="en-US" dirty="0" smtClean="0"/>
+              <a:t>Continuous integration of components</a:t>
+            </a:r>
+          </a:p>
+          <a:p>
+            <a:pPr lvl="1"/>
+            <a:r>
+              <a:rPr lang="en-US" dirty="0" smtClean="0"/>
+              <a:t>Focus on modules completed</a:t>
+            </a:r>
+          </a:p>
+          <a:p>
+            <a:pPr lvl="1"/>
+            <a:r>
+              <a:rPr lang="en-US" dirty="0" smtClean="0"/>
+              <a:t>Not afraid to rework certain sections entirely</a:t>
+            </a:r>
+          </a:p>
+          <a:p>
+            <a:r>
+              <a:rPr lang="en-US" dirty="0" smtClean="0"/>
+              <a:t>Move between roles</a:t>
+            </a:r>
+          </a:p>
+          <a:p>
+            <a:r>
+              <a:rPr lang="en-US" dirty="0" smtClean="0"/>
+              <a:t>Timed meetings</a:t>
+            </a:r>
+          </a:p>
+          <a:p>
+            <a:r>
+              <a:rPr lang="en-US" dirty="0" smtClean="0"/>
+              <a:t>Centralized code versioning and development</a:t>
+            </a:r>
             <a:endParaRPr lang="en-US" dirty="0"/>
           </a:p>
         </p:txBody>
@@ -15187,7 +15625,7 @@
     </p:spTree>
     <p:extLst>
       <p:ext uri="{BB962C8B-B14F-4D97-AF65-F5344CB8AC3E}">
-        <p14:creationId xmlns:p14="http://schemas.microsoft.com/office/powerpoint/2010/main" val="2454133526"/>
+        <p14:creationId xmlns:p14="http://schemas.microsoft.com/office/powerpoint/2010/main" xmlns="" val="2454133526"/>
       </p:ext>
     </p:extLst>
   </p:cSld>
@@ -15256,194 +15694,10 @@
           </a:p>
         </p:txBody>
       </p:sp>
-      <p:grpSp>
-        <p:nvGrpSpPr>
-          <p:cNvPr id="4" name="Group 3"/>
-          <p:cNvGrpSpPr/>
-          <p:nvPr/>
-        </p:nvGrpSpPr>
-        <p:grpSpPr>
-          <a:xfrm>
-            <a:off x="7454900" y="2946400"/>
-            <a:ext cx="457200" cy="406400"/>
-            <a:chOff x="8140700" y="1955800"/>
-            <a:chExt cx="457200" cy="406400"/>
-          </a:xfrm>
-          <a:effectLst>
-            <a:glow rad="25400">
-              <a:srgbClr val="008000">
-                <a:alpha val="75000"/>
-              </a:srgbClr>
-            </a:glow>
-          </a:effectLst>
-        </p:grpSpPr>
-        <p:cxnSp>
-          <p:nvCxnSpPr>
-            <p:cNvPr id="5" name="Straight Connector 4"/>
-            <p:cNvCxnSpPr/>
-            <p:nvPr/>
-          </p:nvCxnSpPr>
-          <p:spPr>
-            <a:xfrm>
-              <a:off x="8140700" y="2209800"/>
-              <a:ext cx="203200" cy="152400"/>
-            </a:xfrm>
-            <a:prstGeom prst="line">
-              <a:avLst/>
-            </a:prstGeom>
-            <a:ln>
-              <a:solidFill>
-                <a:srgbClr val="008000"/>
-              </a:solidFill>
-            </a:ln>
-          </p:spPr>
-          <p:style>
-            <a:lnRef idx="2">
-              <a:schemeClr val="accent1"/>
-            </a:lnRef>
-            <a:fillRef idx="0">
-              <a:schemeClr val="accent1"/>
-            </a:fillRef>
-            <a:effectRef idx="1">
-              <a:schemeClr val="accent1"/>
-            </a:effectRef>
-            <a:fontRef idx="minor">
-              <a:schemeClr val="tx1"/>
-            </a:fontRef>
-          </p:style>
-        </p:cxnSp>
-        <p:cxnSp>
-          <p:nvCxnSpPr>
-            <p:cNvPr id="6" name="Straight Connector 5"/>
-            <p:cNvCxnSpPr/>
-            <p:nvPr/>
-          </p:nvCxnSpPr>
-          <p:spPr>
-            <a:xfrm flipV="1">
-              <a:off x="8343900" y="1955800"/>
-              <a:ext cx="254000" cy="406400"/>
-            </a:xfrm>
-            <a:prstGeom prst="line">
-              <a:avLst/>
-            </a:prstGeom>
-            <a:ln>
-              <a:solidFill>
-                <a:srgbClr val="008000"/>
-              </a:solidFill>
-            </a:ln>
-          </p:spPr>
-          <p:style>
-            <a:lnRef idx="2">
-              <a:schemeClr val="accent1"/>
-            </a:lnRef>
-            <a:fillRef idx="0">
-              <a:schemeClr val="accent1"/>
-            </a:fillRef>
-            <a:effectRef idx="1">
-              <a:schemeClr val="accent1"/>
-            </a:effectRef>
-            <a:fontRef idx="minor">
-              <a:schemeClr val="tx1"/>
-            </a:fontRef>
-          </p:style>
-        </p:cxnSp>
-      </p:grpSp>
-      <p:grpSp>
-        <p:nvGrpSpPr>
-          <p:cNvPr id="7" name="Group 6"/>
-          <p:cNvGrpSpPr/>
-          <p:nvPr/>
-        </p:nvGrpSpPr>
-        <p:grpSpPr>
-          <a:xfrm>
-            <a:off x="8077200" y="3021778"/>
-            <a:ext cx="406400" cy="292922"/>
-            <a:chOff x="8077200" y="3021778"/>
-            <a:chExt cx="406400" cy="292922"/>
-          </a:xfrm>
-          <a:effectLst>
-            <a:glow rad="38100">
-              <a:srgbClr val="FF0000">
-                <a:alpha val="75000"/>
-              </a:srgbClr>
-            </a:glow>
-          </a:effectLst>
-        </p:grpSpPr>
-        <p:cxnSp>
-          <p:nvCxnSpPr>
-            <p:cNvPr id="8" name="Straight Connector 7"/>
-            <p:cNvCxnSpPr/>
-            <p:nvPr/>
-          </p:nvCxnSpPr>
-          <p:spPr>
-            <a:xfrm>
-              <a:off x="8077200" y="3021778"/>
-              <a:ext cx="406400" cy="292922"/>
-            </a:xfrm>
-            <a:prstGeom prst="line">
-              <a:avLst/>
-            </a:prstGeom>
-            <a:ln>
-              <a:solidFill>
-                <a:srgbClr val="FF0000"/>
-              </a:solidFill>
-            </a:ln>
-          </p:spPr>
-          <p:style>
-            <a:lnRef idx="2">
-              <a:schemeClr val="accent1"/>
-            </a:lnRef>
-            <a:fillRef idx="0">
-              <a:schemeClr val="accent1"/>
-            </a:fillRef>
-            <a:effectRef idx="1">
-              <a:schemeClr val="accent1"/>
-            </a:effectRef>
-            <a:fontRef idx="minor">
-              <a:schemeClr val="tx1"/>
-            </a:fontRef>
-          </p:style>
-        </p:cxnSp>
-        <p:cxnSp>
-          <p:nvCxnSpPr>
-            <p:cNvPr id="9" name="Straight Connector 8"/>
-            <p:cNvCxnSpPr/>
-            <p:nvPr/>
-          </p:nvCxnSpPr>
-          <p:spPr>
-            <a:xfrm flipV="1">
-              <a:off x="8077200" y="3021778"/>
-              <a:ext cx="406400" cy="292922"/>
-            </a:xfrm>
-            <a:prstGeom prst="line">
-              <a:avLst/>
-            </a:prstGeom>
-            <a:ln>
-              <a:solidFill>
-                <a:srgbClr val="FF0000"/>
-              </a:solidFill>
-            </a:ln>
-          </p:spPr>
-          <p:style>
-            <a:lnRef idx="2">
-              <a:schemeClr val="accent1"/>
-            </a:lnRef>
-            <a:fillRef idx="0">
-              <a:schemeClr val="accent1"/>
-            </a:fillRef>
-            <a:effectRef idx="1">
-              <a:schemeClr val="accent1"/>
-            </a:effectRef>
-            <a:fontRef idx="minor">
-              <a:schemeClr val="tx1"/>
-            </a:fontRef>
-          </p:style>
-        </p:cxnSp>
-      </p:grpSp>
     </p:spTree>
     <p:extLst>
       <p:ext uri="{BB962C8B-B14F-4D97-AF65-F5344CB8AC3E}">
-        <p14:creationId xmlns:p14="http://schemas.microsoft.com/office/powerpoint/2010/main" val="452808669"/>
+        <p14:creationId xmlns:p14="http://schemas.microsoft.com/office/powerpoint/2010/main" xmlns="" val="452808669"/>
       </p:ext>
     </p:extLst>
   </p:cSld>
@@ -15519,7 +15773,7 @@
     </p:spTree>
     <p:extLst>
       <p:ext uri="{BB962C8B-B14F-4D97-AF65-F5344CB8AC3E}">
-        <p14:creationId xmlns:p14="http://schemas.microsoft.com/office/powerpoint/2010/main" val="2186752886"/>
+        <p14:creationId xmlns:p14="http://schemas.microsoft.com/office/powerpoint/2010/main" xmlns="" val="2186752886"/>
       </p:ext>
     </p:extLst>
   </p:cSld>

</xml_diff>